<commit_message>
Updated titles of modules
</commit_message>
<xml_diff>
--- a/Module_3/presentations/module_3_presentation.pptx
+++ b/Module_3/presentations/module_3_presentation.pptx
@@ -11611,8 +11611,8 @@
         </p:blipFill>
         <p:spPr bwMode="auto">
           <a:xfrm>
-            <a:off x="3356728" y="4227921"/>
-            <a:ext cx="2006338" cy="2006338"/>
+            <a:off x="2960802" y="3558618"/>
+            <a:ext cx="2855536" cy="2855536"/>
           </a:xfrm>
           <a:prstGeom prst="rect">
             <a:avLst/>

</xml_diff>

<commit_message>
Updated Module 3 presentations and questions
</commit_message>
<xml_diff>
--- a/Module_3/presentations/module_3_presentation.pptx
+++ b/Module_3/presentations/module_3_presentation.pptx
@@ -5,7 +5,7 @@
     <p:sldMasterId id="2147483655" r:id="rId1"/>
   </p:sldMasterIdLst>
   <p:notesMasterIdLst>
-    <p:notesMasterId r:id="rId49"/>
+    <p:notesMasterId r:id="rId50"/>
   </p:notesMasterIdLst>
   <p:sldIdLst>
     <p:sldId id="256" r:id="rId2"/>
@@ -16,45 +16,46 @@
     <p:sldId id="492" r:id="rId7"/>
     <p:sldId id="493" r:id="rId8"/>
     <p:sldId id="494" r:id="rId9"/>
-    <p:sldId id="538" r:id="rId10"/>
-    <p:sldId id="539" r:id="rId11"/>
-    <p:sldId id="540" r:id="rId12"/>
-    <p:sldId id="541" r:id="rId13"/>
-    <p:sldId id="542" r:id="rId14"/>
-    <p:sldId id="555" r:id="rId15"/>
-    <p:sldId id="556" r:id="rId16"/>
-    <p:sldId id="553" r:id="rId17"/>
-    <p:sldId id="554" r:id="rId18"/>
-    <p:sldId id="543" r:id="rId19"/>
-    <p:sldId id="544" r:id="rId20"/>
-    <p:sldId id="545" r:id="rId21"/>
-    <p:sldId id="546" r:id="rId22"/>
-    <p:sldId id="547" r:id="rId23"/>
-    <p:sldId id="548" r:id="rId24"/>
-    <p:sldId id="549" r:id="rId25"/>
-    <p:sldId id="550" r:id="rId26"/>
-    <p:sldId id="551" r:id="rId27"/>
-    <p:sldId id="552" r:id="rId28"/>
-    <p:sldId id="557" r:id="rId29"/>
-    <p:sldId id="558" r:id="rId30"/>
-    <p:sldId id="559" r:id="rId31"/>
-    <p:sldId id="560" r:id="rId32"/>
-    <p:sldId id="561" r:id="rId33"/>
-    <p:sldId id="562" r:id="rId34"/>
-    <p:sldId id="563" r:id="rId35"/>
-    <p:sldId id="564" r:id="rId36"/>
-    <p:sldId id="565" r:id="rId37"/>
-    <p:sldId id="566" r:id="rId38"/>
-    <p:sldId id="567" r:id="rId39"/>
-    <p:sldId id="568" r:id="rId40"/>
-    <p:sldId id="569" r:id="rId41"/>
-    <p:sldId id="570" r:id="rId42"/>
-    <p:sldId id="571" r:id="rId43"/>
-    <p:sldId id="572" r:id="rId44"/>
-    <p:sldId id="573" r:id="rId45"/>
-    <p:sldId id="574" r:id="rId46"/>
-    <p:sldId id="575" r:id="rId47"/>
-    <p:sldId id="489" r:id="rId48"/>
+    <p:sldId id="576" r:id="rId10"/>
+    <p:sldId id="538" r:id="rId11"/>
+    <p:sldId id="539" r:id="rId12"/>
+    <p:sldId id="540" r:id="rId13"/>
+    <p:sldId id="541" r:id="rId14"/>
+    <p:sldId id="542" r:id="rId15"/>
+    <p:sldId id="555" r:id="rId16"/>
+    <p:sldId id="556" r:id="rId17"/>
+    <p:sldId id="553" r:id="rId18"/>
+    <p:sldId id="554" r:id="rId19"/>
+    <p:sldId id="543" r:id="rId20"/>
+    <p:sldId id="544" r:id="rId21"/>
+    <p:sldId id="545" r:id="rId22"/>
+    <p:sldId id="546" r:id="rId23"/>
+    <p:sldId id="547" r:id="rId24"/>
+    <p:sldId id="548" r:id="rId25"/>
+    <p:sldId id="549" r:id="rId26"/>
+    <p:sldId id="550" r:id="rId27"/>
+    <p:sldId id="551" r:id="rId28"/>
+    <p:sldId id="552" r:id="rId29"/>
+    <p:sldId id="557" r:id="rId30"/>
+    <p:sldId id="558" r:id="rId31"/>
+    <p:sldId id="559" r:id="rId32"/>
+    <p:sldId id="560" r:id="rId33"/>
+    <p:sldId id="561" r:id="rId34"/>
+    <p:sldId id="562" r:id="rId35"/>
+    <p:sldId id="563" r:id="rId36"/>
+    <p:sldId id="564" r:id="rId37"/>
+    <p:sldId id="565" r:id="rId38"/>
+    <p:sldId id="566" r:id="rId39"/>
+    <p:sldId id="567" r:id="rId40"/>
+    <p:sldId id="568" r:id="rId41"/>
+    <p:sldId id="569" r:id="rId42"/>
+    <p:sldId id="570" r:id="rId43"/>
+    <p:sldId id="571" r:id="rId44"/>
+    <p:sldId id="572" r:id="rId45"/>
+    <p:sldId id="573" r:id="rId46"/>
+    <p:sldId id="574" r:id="rId47"/>
+    <p:sldId id="575" r:id="rId48"/>
+    <p:sldId id="489" r:id="rId49"/>
   </p:sldIdLst>
   <p:sldSz cx="9144000" cy="6858000" type="screen4x3"/>
   <p:notesSz cx="6858000" cy="9144000"/>
@@ -2513,7 +2514,7 @@
             </a:pPr>
             <a:fld id="{00000000-1234-1234-1234-123412341234}" type="slidenum">
               <a:rPr lang="en-US"/>
-              <a:t>47</a:t>
+              <a:t>48</a:t>
             </a:fld>
             <a:endParaRPr lang="en-US"/>
           </a:p>
@@ -6991,6 +6992,305 @@
           <p:cNvPr id="2" name="Title 1">
             <a:extLst>
               <a:ext uri="{FF2B5EF4-FFF2-40B4-BE49-F238E27FC236}">
+                <a16:creationId xmlns:a16="http://schemas.microsoft.com/office/drawing/2014/main" id="{15BC9809-3E68-C44E-8771-33D80E9CA2D9}"/>
+              </a:ext>
+            </a:extLst>
+          </p:cNvPr>
+          <p:cNvSpPr>
+            <a:spLocks noGrp="1"/>
+          </p:cNvSpPr>
+          <p:nvPr>
+            <p:ph type="title"/>
+          </p:nvPr>
+        </p:nvSpPr>
+        <p:spPr/>
+        <p:txBody>
+          <a:bodyPr/>
+          <a:lstStyle/>
+          <a:p>
+            <a:r>
+              <a:rPr lang="en-US" dirty="0"/>
+              <a:t>SWITCH statements in GO</a:t>
+            </a:r>
+          </a:p>
+        </p:txBody>
+      </p:sp>
+      <p:sp>
+        <p:nvSpPr>
+          <p:cNvPr id="3" name="Text Placeholder 2">
+            <a:extLst>
+              <a:ext uri="{FF2B5EF4-FFF2-40B4-BE49-F238E27FC236}">
+                <a16:creationId xmlns:a16="http://schemas.microsoft.com/office/drawing/2014/main" id="{81EDBF52-78A6-DF46-9267-39A9C354CDB0}"/>
+              </a:ext>
+            </a:extLst>
+          </p:cNvPr>
+          <p:cNvSpPr>
+            <a:spLocks noGrp="1"/>
+          </p:cNvSpPr>
+          <p:nvPr>
+            <p:ph type="body" idx="1"/>
+          </p:nvPr>
+        </p:nvSpPr>
+        <p:spPr/>
+        <p:txBody>
+          <a:bodyPr/>
+          <a:lstStyle/>
+          <a:p>
+            <a:r>
+              <a:rPr lang="en-US" dirty="0"/>
+              <a:t> Again- similar to C– the </a:t>
+            </a:r>
+            <a:r>
+              <a:rPr lang="en-US" b="1" dirty="0"/>
+              <a:t>switch</a:t>
+            </a:r>
+            <a:r>
+              <a:rPr lang="en-US" dirty="0"/>
+              <a:t> statement here is mainly to avoid making us create a long series of really ugly </a:t>
+            </a:r>
+            <a:r>
+              <a:rPr lang="en-US" b="1" dirty="0"/>
+              <a:t>if-then</a:t>
+            </a:r>
+            <a:r>
+              <a:rPr lang="en-US" dirty="0"/>
+              <a:t> statements.:</a:t>
+            </a:r>
+          </a:p>
+          <a:p>
+            <a:pPr marL="177800" indent="0">
+              <a:buNone/>
+            </a:pPr>
+            <a:endParaRPr lang="en-US" dirty="0"/>
+          </a:p>
+          <a:p>
+            <a:pPr marL="177800" indent="0">
+              <a:buNone/>
+            </a:pPr>
+            <a:r>
+              <a:rPr lang="en-US" sz="1800" dirty="0" err="1">
+                <a:highlight>
+                  <a:srgbClr val="FFFF00"/>
+                </a:highlight>
+              </a:rPr>
+              <a:t>myRanking</a:t>
+            </a:r>
+            <a:r>
+              <a:rPr lang="en-US" sz="1800" dirty="0">
+                <a:highlight>
+                  <a:srgbClr val="FFFF00"/>
+                </a:highlight>
+              </a:rPr>
+              <a:t> := 7</a:t>
+            </a:r>
+          </a:p>
+          <a:p>
+            <a:pPr marL="177800" indent="0">
+              <a:buNone/>
+            </a:pPr>
+            <a:endParaRPr lang="en-US" sz="1800" dirty="0">
+              <a:highlight>
+                <a:srgbClr val="FFFF00"/>
+              </a:highlight>
+            </a:endParaRPr>
+          </a:p>
+          <a:p>
+            <a:pPr marL="177800" indent="0">
+              <a:buNone/>
+            </a:pPr>
+            <a:r>
+              <a:rPr lang="en-US" sz="1800" dirty="0">
+                <a:highlight>
+                  <a:srgbClr val="FFFF00"/>
+                </a:highlight>
+              </a:rPr>
+              <a:t>switch </a:t>
+            </a:r>
+            <a:r>
+              <a:rPr lang="en-US" sz="1800" dirty="0" err="1">
+                <a:highlight>
+                  <a:srgbClr val="FFFF00"/>
+                </a:highlight>
+              </a:rPr>
+              <a:t>myRanking</a:t>
+            </a:r>
+            <a:r>
+              <a:rPr lang="en-US" sz="1800" dirty="0">
+                <a:highlight>
+                  <a:srgbClr val="FFFF00"/>
+                </a:highlight>
+              </a:rPr>
+              <a:t> {</a:t>
+            </a:r>
+          </a:p>
+          <a:p>
+            <a:pPr marL="177800" indent="0">
+              <a:buNone/>
+            </a:pPr>
+            <a:r>
+              <a:rPr lang="en-US" sz="1800" dirty="0">
+                <a:highlight>
+                  <a:srgbClr val="FFFF00"/>
+                </a:highlight>
+              </a:rPr>
+              <a:t>	case 1:</a:t>
+            </a:r>
+          </a:p>
+          <a:p>
+            <a:pPr marL="177800" indent="0">
+              <a:buNone/>
+            </a:pPr>
+            <a:r>
+              <a:rPr lang="en-US" sz="1800" dirty="0">
+                <a:highlight>
+                  <a:srgbClr val="FFFF00"/>
+                </a:highlight>
+              </a:rPr>
+              <a:t>		</a:t>
+            </a:r>
+            <a:r>
+              <a:rPr lang="en-US" sz="1800" dirty="0" err="1">
+                <a:highlight>
+                  <a:srgbClr val="FFFF00"/>
+                </a:highlight>
+              </a:rPr>
+              <a:t>fmt.Println</a:t>
+            </a:r>
+            <a:r>
+              <a:rPr lang="en-US" sz="1800" dirty="0">
+                <a:highlight>
+                  <a:srgbClr val="FFFF00"/>
+                </a:highlight>
+              </a:rPr>
+              <a:t>(“Terrible”)</a:t>
+            </a:r>
+          </a:p>
+          <a:p>
+            <a:pPr marL="177800" indent="0">
+              <a:buNone/>
+            </a:pPr>
+            <a:r>
+              <a:rPr lang="en-US" sz="1800" dirty="0">
+                <a:highlight>
+                  <a:srgbClr val="FFFF00"/>
+                </a:highlight>
+              </a:rPr>
+              <a:t>	case 2:</a:t>
+            </a:r>
+          </a:p>
+          <a:p>
+            <a:pPr marL="177800" indent="0">
+              <a:buNone/>
+            </a:pPr>
+            <a:r>
+              <a:rPr lang="en-US" sz="1800" dirty="0">
+                <a:highlight>
+                  <a:srgbClr val="FFFF00"/>
+                </a:highlight>
+              </a:rPr>
+              <a:t>		</a:t>
+            </a:r>
+            <a:r>
+              <a:rPr lang="en-US" sz="1800" dirty="0" err="1">
+                <a:highlight>
+                  <a:srgbClr val="FFFF00"/>
+                </a:highlight>
+              </a:rPr>
+              <a:t>fmt.Println</a:t>
+            </a:r>
+            <a:r>
+              <a:rPr lang="en-US" sz="1800" dirty="0">
+                <a:highlight>
+                  <a:srgbClr val="FFFF00"/>
+                </a:highlight>
+              </a:rPr>
+              <a:t>(“Really Bad”)</a:t>
+            </a:r>
+          </a:p>
+        </p:txBody>
+      </p:sp>
+      <p:pic>
+        <p:nvPicPr>
+          <p:cNvPr id="5122" name="Picture 2" descr="Image result for go gopher images">
+            <a:extLst>
+              <a:ext uri="{FF2B5EF4-FFF2-40B4-BE49-F238E27FC236}">
+                <a16:creationId xmlns:a16="http://schemas.microsoft.com/office/drawing/2014/main" id="{29AC8BFE-B467-E445-93E8-69788BB4BF28}"/>
+              </a:ext>
+            </a:extLst>
+          </p:cNvPr>
+          <p:cNvPicPr>
+            <a:picLocks noChangeAspect="1" noChangeArrowheads="1"/>
+          </p:cNvPicPr>
+          <p:nvPr/>
+        </p:nvPicPr>
+        <p:blipFill>
+          <a:blip r:embed="rId2">
+            <a:extLst>
+              <a:ext uri="{28A0092B-C50C-407E-A947-70E740481C1C}">
+                <a14:useLocalDpi xmlns:a14="http://schemas.microsoft.com/office/drawing/2010/main" val="0"/>
+              </a:ext>
+            </a:extLst>
+          </a:blip>
+          <a:srcRect/>
+          <a:stretch>
+            <a:fillRect/>
+          </a:stretch>
+        </p:blipFill>
+        <p:spPr bwMode="auto">
+          <a:xfrm>
+            <a:off x="5481098" y="2961784"/>
+            <a:ext cx="2857500" cy="2857500"/>
+          </a:xfrm>
+          <a:prstGeom prst="rect">
+            <a:avLst/>
+          </a:prstGeom>
+          <a:noFill/>
+          <a:extLst>
+            <a:ext uri="{909E8E84-426E-40DD-AFC4-6F175D3DCCD1}">
+              <a14:hiddenFill xmlns:a14="http://schemas.microsoft.com/office/drawing/2010/main">
+                <a:solidFill>
+                  <a:srgbClr val="FFFFFF"/>
+                </a:solidFill>
+              </a14:hiddenFill>
+            </a:ext>
+          </a:extLst>
+        </p:spPr>
+      </p:pic>
+    </p:spTree>
+    <p:extLst>
+      <p:ext uri="{BB962C8B-B14F-4D97-AF65-F5344CB8AC3E}">
+        <p14:creationId xmlns:p14="http://schemas.microsoft.com/office/powerpoint/2010/main" val="948789108"/>
+      </p:ext>
+    </p:extLst>
+  </p:cSld>
+  <p:clrMapOvr>
+    <a:masterClrMapping/>
+  </p:clrMapOvr>
+</p:sld>
+</file>
+
+<file path=ppt/slides/slide11.xml><?xml version="1.0" encoding="utf-8"?>
+<p:sld xmlns:a="http://schemas.openxmlformats.org/drawingml/2006/main" xmlns:r="http://schemas.openxmlformats.org/officeDocument/2006/relationships" xmlns:p="http://schemas.openxmlformats.org/presentationml/2006/main">
+  <p:cSld>
+    <p:spTree>
+      <p:nvGrpSpPr>
+        <p:cNvPr id="1" name=""/>
+        <p:cNvGrpSpPr/>
+        <p:nvPr/>
+      </p:nvGrpSpPr>
+      <p:grpSpPr>
+        <a:xfrm>
+          <a:off x="0" y="0"/>
+          <a:ext cx="0" cy="0"/>
+          <a:chOff x="0" y="0"/>
+          <a:chExt cx="0" cy="0"/>
+        </a:xfrm>
+      </p:grpSpPr>
+      <p:sp>
+        <p:nvSpPr>
+          <p:cNvPr id="2" name="Title 1">
+            <a:extLst>
+              <a:ext uri="{FF2B5EF4-FFF2-40B4-BE49-F238E27FC236}">
                 <a16:creationId xmlns:a16="http://schemas.microsoft.com/office/drawing/2014/main" id="{DEFEE08B-52AA-C947-BE6F-51B01713516B}"/>
               </a:ext>
             </a:extLst>
@@ -7295,7 +7595,7 @@
 </p:sld>
 </file>
 
-<file path=ppt/slides/slide11.xml><?xml version="1.0" encoding="utf-8"?>
+<file path=ppt/slides/slide12.xml><?xml version="1.0" encoding="utf-8"?>
 <p:sld xmlns:a="http://schemas.openxmlformats.org/drawingml/2006/main" xmlns:r="http://schemas.openxmlformats.org/officeDocument/2006/relationships" xmlns:p="http://schemas.openxmlformats.org/presentationml/2006/main">
   <p:cSld>
     <p:spTree>
@@ -7580,7 +7880,7 @@
 </p:sld>
 </file>
 
-<file path=ppt/slides/slide12.xml><?xml version="1.0" encoding="utf-8"?>
+<file path=ppt/slides/slide13.xml><?xml version="1.0" encoding="utf-8"?>
 <p:sld xmlns:a="http://schemas.openxmlformats.org/drawingml/2006/main" xmlns:r="http://schemas.openxmlformats.org/officeDocument/2006/relationships" xmlns:p="http://schemas.openxmlformats.org/presentationml/2006/main">
   <p:cSld>
     <p:spTree>
@@ -7968,7 +8268,7 @@
 </p:sld>
 </file>
 
-<file path=ppt/slides/slide13.xml><?xml version="1.0" encoding="utf-8"?>
+<file path=ppt/slides/slide14.xml><?xml version="1.0" encoding="utf-8"?>
 <p:sld xmlns:a="http://schemas.openxmlformats.org/drawingml/2006/main" xmlns:r="http://schemas.openxmlformats.org/officeDocument/2006/relationships" xmlns:p="http://schemas.openxmlformats.org/presentationml/2006/main">
   <p:cSld>
     <p:spTree>
@@ -8278,7 +8578,7 @@
 </p:sld>
 </file>
 
-<file path=ppt/slides/slide14.xml><?xml version="1.0" encoding="utf-8"?>
+<file path=ppt/slides/slide15.xml><?xml version="1.0" encoding="utf-8"?>
 <p:sld xmlns:a="http://schemas.openxmlformats.org/drawingml/2006/main" xmlns:r="http://schemas.openxmlformats.org/officeDocument/2006/relationships" xmlns:p="http://schemas.openxmlformats.org/presentationml/2006/main">
   <p:cSld>
     <p:spTree>
@@ -8457,7 +8757,7 @@
 </p:sld>
 </file>
 
-<file path=ppt/slides/slide15.xml><?xml version="1.0" encoding="utf-8"?>
+<file path=ppt/slides/slide16.xml><?xml version="1.0" encoding="utf-8"?>
 <p:sld xmlns:a="http://schemas.openxmlformats.org/drawingml/2006/main" xmlns:r="http://schemas.openxmlformats.org/officeDocument/2006/relationships" xmlns:p="http://schemas.openxmlformats.org/presentationml/2006/main">
   <p:cSld>
     <p:spTree>
@@ -8697,7 +8997,7 @@
 </p:sld>
 </file>
 
-<file path=ppt/slides/slide16.xml><?xml version="1.0" encoding="utf-8"?>
+<file path=ppt/slides/slide17.xml><?xml version="1.0" encoding="utf-8"?>
 <p:sld xmlns:a="http://schemas.openxmlformats.org/drawingml/2006/main" xmlns:r="http://schemas.openxmlformats.org/officeDocument/2006/relationships" xmlns:p="http://schemas.openxmlformats.org/presentationml/2006/main">
   <p:cSld>
     <p:spTree>
@@ -8858,7 +9158,7 @@
 </p:sld>
 </file>
 
-<file path=ppt/slides/slide17.xml><?xml version="1.0" encoding="utf-8"?>
+<file path=ppt/slides/slide18.xml><?xml version="1.0" encoding="utf-8"?>
 <p:sld xmlns:a="http://schemas.openxmlformats.org/drawingml/2006/main" xmlns:r="http://schemas.openxmlformats.org/officeDocument/2006/relationships" xmlns:p="http://schemas.openxmlformats.org/presentationml/2006/main">
   <p:cSld>
     <p:spTree>
@@ -9017,7 +9317,7 @@
 </p:sld>
 </file>
 
-<file path=ppt/slides/slide18.xml><?xml version="1.0" encoding="utf-8"?>
+<file path=ppt/slides/slide19.xml><?xml version="1.0" encoding="utf-8"?>
 <p:sld xmlns:a="http://schemas.openxmlformats.org/drawingml/2006/main" xmlns:r="http://schemas.openxmlformats.org/officeDocument/2006/relationships" xmlns:p="http://schemas.openxmlformats.org/presentationml/2006/main">
   <p:cSld>
     <p:spTree>
@@ -9181,167 +9481,6 @@
     <p:extLst>
       <p:ext uri="{BB962C8B-B14F-4D97-AF65-F5344CB8AC3E}">
         <p14:creationId xmlns:p14="http://schemas.microsoft.com/office/powerpoint/2010/main" val="2769453810"/>
-      </p:ext>
-    </p:extLst>
-  </p:cSld>
-  <p:clrMapOvr>
-    <a:masterClrMapping/>
-  </p:clrMapOvr>
-</p:sld>
-</file>
-
-<file path=ppt/slides/slide19.xml><?xml version="1.0" encoding="utf-8"?>
-<p:sld xmlns:a="http://schemas.openxmlformats.org/drawingml/2006/main" xmlns:r="http://schemas.openxmlformats.org/officeDocument/2006/relationships" xmlns:p="http://schemas.openxmlformats.org/presentationml/2006/main">
-  <p:cSld>
-    <p:spTree>
-      <p:nvGrpSpPr>
-        <p:cNvPr id="1" name=""/>
-        <p:cNvGrpSpPr/>
-        <p:nvPr/>
-      </p:nvGrpSpPr>
-      <p:grpSpPr>
-        <a:xfrm>
-          <a:off x="0" y="0"/>
-          <a:ext cx="0" cy="0"/>
-          <a:chOff x="0" y="0"/>
-          <a:chExt cx="0" cy="0"/>
-        </a:xfrm>
-      </p:grpSpPr>
-      <p:sp>
-        <p:nvSpPr>
-          <p:cNvPr id="2" name="Title 1">
-            <a:extLst>
-              <a:ext uri="{FF2B5EF4-FFF2-40B4-BE49-F238E27FC236}">
-                <a16:creationId xmlns:a16="http://schemas.microsoft.com/office/drawing/2014/main" id="{4695E743-D7EB-0640-B7FA-2E514C0654BD}"/>
-              </a:ext>
-            </a:extLst>
-          </p:cNvPr>
-          <p:cNvSpPr>
-            <a:spLocks noGrp="1"/>
-          </p:cNvSpPr>
-          <p:nvPr>
-            <p:ph type="title"/>
-          </p:nvPr>
-        </p:nvSpPr>
-        <p:spPr/>
-        <p:txBody>
-          <a:bodyPr/>
-          <a:lstStyle/>
-          <a:p>
-            <a:r>
-              <a:rPr lang="en-US" dirty="0"/>
-              <a:t>Pointers in GO- practically</a:t>
-            </a:r>
-          </a:p>
-        </p:txBody>
-      </p:sp>
-      <p:sp>
-        <p:nvSpPr>
-          <p:cNvPr id="3" name="Text Placeholder 2">
-            <a:extLst>
-              <a:ext uri="{FF2B5EF4-FFF2-40B4-BE49-F238E27FC236}">
-                <a16:creationId xmlns:a16="http://schemas.microsoft.com/office/drawing/2014/main" id="{88B67FA4-A6C5-0D4E-80F6-B08A1C2947E9}"/>
-              </a:ext>
-            </a:extLst>
-          </p:cNvPr>
-          <p:cNvSpPr>
-            <a:spLocks noGrp="1"/>
-          </p:cNvSpPr>
-          <p:nvPr>
-            <p:ph type="body" idx="1"/>
-          </p:nvPr>
-        </p:nvSpPr>
-        <p:spPr/>
-        <p:txBody>
-          <a:bodyPr/>
-          <a:lstStyle/>
-          <a:p>
-            <a:r>
-              <a:rPr lang="en-US" dirty="0"/>
-              <a:t> So it’s important to remember that fundamentally what a pointer does is </a:t>
-            </a:r>
-            <a:r>
-              <a:rPr lang="en-US" i="1" dirty="0"/>
-              <a:t>point to the memory address of a variable</a:t>
-            </a:r>
-            <a:r>
-              <a:rPr lang="en-US" dirty="0"/>
-              <a:t>. </a:t>
-            </a:r>
-          </a:p>
-          <a:p>
-            <a:r>
-              <a:rPr lang="en-US" dirty="0"/>
-              <a:t> A </a:t>
-            </a:r>
-            <a:r>
-              <a:rPr lang="en-US" b="1" dirty="0"/>
-              <a:t>variable</a:t>
-            </a:r>
-            <a:r>
-              <a:rPr lang="en-US" dirty="0"/>
-              <a:t> in any language is just a nickname for a memory location where that value is stored.</a:t>
-            </a:r>
-          </a:p>
-          <a:p>
-            <a:r>
-              <a:rPr lang="en-US" dirty="0"/>
-              <a:t>Back in the day programmers had to remember memory locations. It sucked.</a:t>
-            </a:r>
-          </a:p>
-        </p:txBody>
-      </p:sp>
-      <p:pic>
-        <p:nvPicPr>
-          <p:cNvPr id="2050" name="Picture 2" descr="https://dave.cheney.net/wp-content/uploads/2017/04/Untitled.png">
-            <a:extLst>
-              <a:ext uri="{FF2B5EF4-FFF2-40B4-BE49-F238E27FC236}">
-                <a16:creationId xmlns:a16="http://schemas.microsoft.com/office/drawing/2014/main" id="{51FCD376-23B9-884E-9786-AE0EB06D4A8B}"/>
-              </a:ext>
-            </a:extLst>
-          </p:cNvPr>
-          <p:cNvPicPr>
-            <a:picLocks noChangeAspect="1" noChangeArrowheads="1"/>
-          </p:cNvPicPr>
-          <p:nvPr/>
-        </p:nvPicPr>
-        <p:blipFill>
-          <a:blip r:embed="rId2">
-            <a:extLst>
-              <a:ext uri="{28A0092B-C50C-407E-A947-70E740481C1C}">
-                <a14:useLocalDpi xmlns:a14="http://schemas.microsoft.com/office/drawing/2010/main" val="0"/>
-              </a:ext>
-            </a:extLst>
-          </a:blip>
-          <a:srcRect/>
-          <a:stretch>
-            <a:fillRect/>
-          </a:stretch>
-        </p:blipFill>
-        <p:spPr bwMode="auto">
-          <a:xfrm>
-            <a:off x="1867294" y="4675155"/>
-            <a:ext cx="5212236" cy="1622489"/>
-          </a:xfrm>
-          <a:prstGeom prst="rect">
-            <a:avLst/>
-          </a:prstGeom>
-          <a:noFill/>
-          <a:extLst>
-            <a:ext uri="{909E8E84-426E-40DD-AFC4-6F175D3DCCD1}">
-              <a14:hiddenFill xmlns:a14="http://schemas.microsoft.com/office/drawing/2010/main">
-                <a:solidFill>
-                  <a:srgbClr val="FFFFFF"/>
-                </a:solidFill>
-              </a14:hiddenFill>
-            </a:ext>
-          </a:extLst>
-        </p:spPr>
-      </p:pic>
-    </p:spTree>
-    <p:extLst>
-      <p:ext uri="{BB962C8B-B14F-4D97-AF65-F5344CB8AC3E}">
-        <p14:creationId xmlns:p14="http://schemas.microsoft.com/office/powerpoint/2010/main" val="1312355527"/>
       </p:ext>
     </p:extLst>
   </p:cSld>
@@ -9492,6 +9631,167 @@
           <p:cNvPr id="2" name="Title 1">
             <a:extLst>
               <a:ext uri="{FF2B5EF4-FFF2-40B4-BE49-F238E27FC236}">
+                <a16:creationId xmlns:a16="http://schemas.microsoft.com/office/drawing/2014/main" id="{4695E743-D7EB-0640-B7FA-2E514C0654BD}"/>
+              </a:ext>
+            </a:extLst>
+          </p:cNvPr>
+          <p:cNvSpPr>
+            <a:spLocks noGrp="1"/>
+          </p:cNvSpPr>
+          <p:nvPr>
+            <p:ph type="title"/>
+          </p:nvPr>
+        </p:nvSpPr>
+        <p:spPr/>
+        <p:txBody>
+          <a:bodyPr/>
+          <a:lstStyle/>
+          <a:p>
+            <a:r>
+              <a:rPr lang="en-US" dirty="0"/>
+              <a:t>Pointers in GO- practically</a:t>
+            </a:r>
+          </a:p>
+        </p:txBody>
+      </p:sp>
+      <p:sp>
+        <p:nvSpPr>
+          <p:cNvPr id="3" name="Text Placeholder 2">
+            <a:extLst>
+              <a:ext uri="{FF2B5EF4-FFF2-40B4-BE49-F238E27FC236}">
+                <a16:creationId xmlns:a16="http://schemas.microsoft.com/office/drawing/2014/main" id="{88B67FA4-A6C5-0D4E-80F6-B08A1C2947E9}"/>
+              </a:ext>
+            </a:extLst>
+          </p:cNvPr>
+          <p:cNvSpPr>
+            <a:spLocks noGrp="1"/>
+          </p:cNvSpPr>
+          <p:nvPr>
+            <p:ph type="body" idx="1"/>
+          </p:nvPr>
+        </p:nvSpPr>
+        <p:spPr/>
+        <p:txBody>
+          <a:bodyPr/>
+          <a:lstStyle/>
+          <a:p>
+            <a:r>
+              <a:rPr lang="en-US" dirty="0"/>
+              <a:t> So it’s important to remember that fundamentally what a pointer does is </a:t>
+            </a:r>
+            <a:r>
+              <a:rPr lang="en-US" i="1" dirty="0"/>
+              <a:t>point to the memory address of a variable</a:t>
+            </a:r>
+            <a:r>
+              <a:rPr lang="en-US" dirty="0"/>
+              <a:t>. </a:t>
+            </a:r>
+          </a:p>
+          <a:p>
+            <a:r>
+              <a:rPr lang="en-US" dirty="0"/>
+              <a:t> A </a:t>
+            </a:r>
+            <a:r>
+              <a:rPr lang="en-US" b="1" dirty="0"/>
+              <a:t>variable</a:t>
+            </a:r>
+            <a:r>
+              <a:rPr lang="en-US" dirty="0"/>
+              <a:t> in any language is just a nickname for a memory location where that value is stored.</a:t>
+            </a:r>
+          </a:p>
+          <a:p>
+            <a:r>
+              <a:rPr lang="en-US" dirty="0"/>
+              <a:t>Back in the day programmers had to remember memory locations. It sucked.</a:t>
+            </a:r>
+          </a:p>
+        </p:txBody>
+      </p:sp>
+      <p:pic>
+        <p:nvPicPr>
+          <p:cNvPr id="2050" name="Picture 2" descr="https://dave.cheney.net/wp-content/uploads/2017/04/Untitled.png">
+            <a:extLst>
+              <a:ext uri="{FF2B5EF4-FFF2-40B4-BE49-F238E27FC236}">
+                <a16:creationId xmlns:a16="http://schemas.microsoft.com/office/drawing/2014/main" id="{51FCD376-23B9-884E-9786-AE0EB06D4A8B}"/>
+              </a:ext>
+            </a:extLst>
+          </p:cNvPr>
+          <p:cNvPicPr>
+            <a:picLocks noChangeAspect="1" noChangeArrowheads="1"/>
+          </p:cNvPicPr>
+          <p:nvPr/>
+        </p:nvPicPr>
+        <p:blipFill>
+          <a:blip r:embed="rId2">
+            <a:extLst>
+              <a:ext uri="{28A0092B-C50C-407E-A947-70E740481C1C}">
+                <a14:useLocalDpi xmlns:a14="http://schemas.microsoft.com/office/drawing/2010/main" val="0"/>
+              </a:ext>
+            </a:extLst>
+          </a:blip>
+          <a:srcRect/>
+          <a:stretch>
+            <a:fillRect/>
+          </a:stretch>
+        </p:blipFill>
+        <p:spPr bwMode="auto">
+          <a:xfrm>
+            <a:off x="1867294" y="4675155"/>
+            <a:ext cx="5212236" cy="1622489"/>
+          </a:xfrm>
+          <a:prstGeom prst="rect">
+            <a:avLst/>
+          </a:prstGeom>
+          <a:noFill/>
+          <a:extLst>
+            <a:ext uri="{909E8E84-426E-40DD-AFC4-6F175D3DCCD1}">
+              <a14:hiddenFill xmlns:a14="http://schemas.microsoft.com/office/drawing/2010/main">
+                <a:solidFill>
+                  <a:srgbClr val="FFFFFF"/>
+                </a:solidFill>
+              </a14:hiddenFill>
+            </a:ext>
+          </a:extLst>
+        </p:spPr>
+      </p:pic>
+    </p:spTree>
+    <p:extLst>
+      <p:ext uri="{BB962C8B-B14F-4D97-AF65-F5344CB8AC3E}">
+        <p14:creationId xmlns:p14="http://schemas.microsoft.com/office/powerpoint/2010/main" val="1312355527"/>
+      </p:ext>
+    </p:extLst>
+  </p:cSld>
+  <p:clrMapOvr>
+    <a:masterClrMapping/>
+  </p:clrMapOvr>
+</p:sld>
+</file>
+
+<file path=ppt/slides/slide21.xml><?xml version="1.0" encoding="utf-8"?>
+<p:sld xmlns:a="http://schemas.openxmlformats.org/drawingml/2006/main" xmlns:r="http://schemas.openxmlformats.org/officeDocument/2006/relationships" xmlns:p="http://schemas.openxmlformats.org/presentationml/2006/main">
+  <p:cSld>
+    <p:spTree>
+      <p:nvGrpSpPr>
+        <p:cNvPr id="1" name=""/>
+        <p:cNvGrpSpPr/>
+        <p:nvPr/>
+      </p:nvGrpSpPr>
+      <p:grpSpPr>
+        <a:xfrm>
+          <a:off x="0" y="0"/>
+          <a:ext cx="0" cy="0"/>
+          <a:chOff x="0" y="0"/>
+          <a:chExt cx="0" cy="0"/>
+        </a:xfrm>
+      </p:grpSpPr>
+      <p:sp>
+        <p:nvSpPr>
+          <p:cNvPr id="2" name="Title 1">
+            <a:extLst>
+              <a:ext uri="{FF2B5EF4-FFF2-40B4-BE49-F238E27FC236}">
                 <a16:creationId xmlns:a16="http://schemas.microsoft.com/office/drawing/2014/main" id="{1110D384-D8D4-BF43-A616-931954186447}"/>
               </a:ext>
             </a:extLst>
@@ -9761,7 +10061,7 @@
 </p:sld>
 </file>
 
-<file path=ppt/slides/slide21.xml><?xml version="1.0" encoding="utf-8"?>
+<file path=ppt/slides/slide22.xml><?xml version="1.0" encoding="utf-8"?>
 <p:sld xmlns:a="http://schemas.openxmlformats.org/drawingml/2006/main" xmlns:r="http://schemas.openxmlformats.org/officeDocument/2006/relationships" xmlns:p="http://schemas.openxmlformats.org/presentationml/2006/main">
   <p:cSld>
     <p:spTree>
@@ -9959,7 +10259,7 @@
 </p:sld>
 </file>
 
-<file path=ppt/slides/slide22.xml><?xml version="1.0" encoding="utf-8"?>
+<file path=ppt/slides/slide23.xml><?xml version="1.0" encoding="utf-8"?>
 <p:sld xmlns:a="http://schemas.openxmlformats.org/drawingml/2006/main" xmlns:r="http://schemas.openxmlformats.org/officeDocument/2006/relationships" xmlns:p="http://schemas.openxmlformats.org/presentationml/2006/main">
   <p:cSld>
     <p:spTree>
@@ -10146,7 +10446,7 @@
 </p:sld>
 </file>
 
-<file path=ppt/slides/slide23.xml><?xml version="1.0" encoding="utf-8"?>
+<file path=ppt/slides/slide24.xml><?xml version="1.0" encoding="utf-8"?>
 <p:sld xmlns:a="http://schemas.openxmlformats.org/drawingml/2006/main" xmlns:r="http://schemas.openxmlformats.org/officeDocument/2006/relationships" xmlns:p="http://schemas.openxmlformats.org/presentationml/2006/main">
   <p:cSld>
     <p:spTree>
@@ -10394,7 +10694,7 @@
 </p:sld>
 </file>
 
-<file path=ppt/slides/slide24.xml><?xml version="1.0" encoding="utf-8"?>
+<file path=ppt/slides/slide25.xml><?xml version="1.0" encoding="utf-8"?>
 <p:sld xmlns:a="http://schemas.openxmlformats.org/drawingml/2006/main" xmlns:r="http://schemas.openxmlformats.org/officeDocument/2006/relationships" xmlns:p="http://schemas.openxmlformats.org/presentationml/2006/main">
   <p:cSld>
     <p:spTree>
@@ -10699,7 +10999,7 @@
 </p:sld>
 </file>
 
-<file path=ppt/slides/slide25.xml><?xml version="1.0" encoding="utf-8"?>
+<file path=ppt/slides/slide26.xml><?xml version="1.0" encoding="utf-8"?>
 <p:sld xmlns:a="http://schemas.openxmlformats.org/drawingml/2006/main" xmlns:r="http://schemas.openxmlformats.org/officeDocument/2006/relationships" xmlns:p="http://schemas.openxmlformats.org/presentationml/2006/main">
   <p:cSld>
     <p:spTree>
@@ -10903,7 +11203,7 @@
 </p:sld>
 </file>
 
-<file path=ppt/slides/slide26.xml><?xml version="1.0" encoding="utf-8"?>
+<file path=ppt/slides/slide27.xml><?xml version="1.0" encoding="utf-8"?>
 <p:sld xmlns:a="http://schemas.openxmlformats.org/drawingml/2006/main" xmlns:r="http://schemas.openxmlformats.org/officeDocument/2006/relationships" xmlns:p="http://schemas.openxmlformats.org/presentationml/2006/main">
   <p:cSld>
     <p:spTree>
@@ -11189,7 +11489,7 @@
 </p:sld>
 </file>
 
-<file path=ppt/slides/slide27.xml><?xml version="1.0" encoding="utf-8"?>
+<file path=ppt/slides/slide28.xml><?xml version="1.0" encoding="utf-8"?>
 <p:sld xmlns:a="http://schemas.openxmlformats.org/drawingml/2006/main" xmlns:r="http://schemas.openxmlformats.org/officeDocument/2006/relationships" xmlns:p="http://schemas.openxmlformats.org/presentationml/2006/main">
   <p:cSld>
     <p:spTree>
@@ -11506,7 +11806,7 @@
 </p:sld>
 </file>
 
-<file path=ppt/slides/slide28.xml><?xml version="1.0" encoding="utf-8"?>
+<file path=ppt/slides/slide29.xml><?xml version="1.0" encoding="utf-8"?>
 <p:sld xmlns:a="http://schemas.openxmlformats.org/drawingml/2006/main" xmlns:r="http://schemas.openxmlformats.org/officeDocument/2006/relationships" xmlns:p="http://schemas.openxmlformats.org/presentationml/2006/main">
   <p:cSld>
     <p:spTree>
@@ -11651,179 +11951,6 @@
     <p:extLst>
       <p:ext uri="{BB962C8B-B14F-4D97-AF65-F5344CB8AC3E}">
         <p14:creationId xmlns:p14="http://schemas.microsoft.com/office/powerpoint/2010/main" val="3222373295"/>
-      </p:ext>
-    </p:extLst>
-  </p:cSld>
-  <p:clrMapOvr>
-    <a:masterClrMapping/>
-  </p:clrMapOvr>
-</p:sld>
-</file>
-
-<file path=ppt/slides/slide29.xml><?xml version="1.0" encoding="utf-8"?>
-<p:sld xmlns:a="http://schemas.openxmlformats.org/drawingml/2006/main" xmlns:r="http://schemas.openxmlformats.org/officeDocument/2006/relationships" xmlns:p="http://schemas.openxmlformats.org/presentationml/2006/main">
-  <p:cSld>
-    <p:spTree>
-      <p:nvGrpSpPr>
-        <p:cNvPr id="1" name=""/>
-        <p:cNvGrpSpPr/>
-        <p:nvPr/>
-      </p:nvGrpSpPr>
-      <p:grpSpPr>
-        <a:xfrm>
-          <a:off x="0" y="0"/>
-          <a:ext cx="0" cy="0"/>
-          <a:chOff x="0" y="0"/>
-          <a:chExt cx="0" cy="0"/>
-        </a:xfrm>
-      </p:grpSpPr>
-      <p:sp>
-        <p:nvSpPr>
-          <p:cNvPr id="2" name="Title 1">
-            <a:extLst>
-              <a:ext uri="{FF2B5EF4-FFF2-40B4-BE49-F238E27FC236}">
-                <a16:creationId xmlns:a16="http://schemas.microsoft.com/office/drawing/2014/main" id="{5ED9DDD5-5CCB-8F4E-8491-C0C94F622400}"/>
-              </a:ext>
-            </a:extLst>
-          </p:cNvPr>
-          <p:cNvSpPr>
-            <a:spLocks noGrp="1"/>
-          </p:cNvSpPr>
-          <p:nvPr>
-            <p:ph type="title"/>
-          </p:nvPr>
-        </p:nvSpPr>
-        <p:spPr/>
-        <p:txBody>
-          <a:bodyPr/>
-          <a:lstStyle/>
-          <a:p>
-            <a:r>
-              <a:rPr lang="en-US" dirty="0"/>
-              <a:t>JSON package in GO</a:t>
-            </a:r>
-          </a:p>
-        </p:txBody>
-      </p:sp>
-      <p:sp>
-        <p:nvSpPr>
-          <p:cNvPr id="3" name="Text Placeholder 2">
-            <a:extLst>
-              <a:ext uri="{FF2B5EF4-FFF2-40B4-BE49-F238E27FC236}">
-                <a16:creationId xmlns:a16="http://schemas.microsoft.com/office/drawing/2014/main" id="{06AC7DC0-30A2-5B46-AD41-B2F75845C8EF}"/>
-              </a:ext>
-            </a:extLst>
-          </p:cNvPr>
-          <p:cNvSpPr>
-            <a:spLocks noGrp="1"/>
-          </p:cNvSpPr>
-          <p:nvPr>
-            <p:ph type="body" idx="1"/>
-          </p:nvPr>
-        </p:nvSpPr>
-        <p:spPr/>
-        <p:txBody>
-          <a:bodyPr/>
-          <a:lstStyle/>
-          <a:p>
-            <a:r>
-              <a:rPr lang="en-US" dirty="0"/>
-              <a:t> Most data in modern web applications is passed around in </a:t>
-            </a:r>
-            <a:r>
-              <a:rPr lang="en-US" dirty="0" err="1"/>
-              <a:t>Javascript</a:t>
-            </a:r>
-            <a:r>
-              <a:rPr lang="en-US" dirty="0"/>
-              <a:t> Object Notation (JSON).</a:t>
-            </a:r>
-          </a:p>
-          <a:p>
-            <a:r>
-              <a:rPr lang="en-US" dirty="0"/>
-              <a:t> GO comes with a </a:t>
-            </a:r>
-            <a:r>
-              <a:rPr lang="en-US" b="1" dirty="0"/>
-              <a:t>built-in</a:t>
-            </a:r>
-            <a:r>
-              <a:rPr lang="en-US" dirty="0"/>
-              <a:t> JSON package that allows you to </a:t>
-            </a:r>
-            <a:r>
-              <a:rPr lang="en-US" b="1" dirty="0"/>
-              <a:t>marshal/</a:t>
-            </a:r>
-            <a:r>
-              <a:rPr lang="en-US" b="1" dirty="0" err="1"/>
-              <a:t>unmarshal</a:t>
-            </a:r>
-            <a:r>
-              <a:rPr lang="en-US" dirty="0"/>
-              <a:t> data between structs and JSON types. </a:t>
-            </a:r>
-          </a:p>
-          <a:p>
-            <a:r>
-              <a:rPr lang="en-US" dirty="0"/>
-              <a:t>This is one of the most commonly utilized packages in GO and understanding it is essential.</a:t>
-            </a:r>
-          </a:p>
-        </p:txBody>
-      </p:sp>
-      <p:pic>
-        <p:nvPicPr>
-          <p:cNvPr id="1026" name="Picture 2" descr="Image result for go gopher">
-            <a:extLst>
-              <a:ext uri="{FF2B5EF4-FFF2-40B4-BE49-F238E27FC236}">
-                <a16:creationId xmlns:a16="http://schemas.microsoft.com/office/drawing/2014/main" id="{3275883E-32CB-1E4C-B34A-EB3A2EC71D9E}"/>
-              </a:ext>
-            </a:extLst>
-          </p:cNvPr>
-          <p:cNvPicPr>
-            <a:picLocks noChangeAspect="1" noChangeArrowheads="1"/>
-          </p:cNvPicPr>
-          <p:nvPr/>
-        </p:nvPicPr>
-        <p:blipFill>
-          <a:blip r:embed="rId2">
-            <a:extLst>
-              <a:ext uri="{28A0092B-C50C-407E-A947-70E740481C1C}">
-                <a14:useLocalDpi xmlns:a14="http://schemas.microsoft.com/office/drawing/2010/main" val="0"/>
-              </a:ext>
-            </a:extLst>
-          </a:blip>
-          <a:srcRect/>
-          <a:stretch>
-            <a:fillRect/>
-          </a:stretch>
-        </p:blipFill>
-        <p:spPr bwMode="auto">
-          <a:xfrm>
-            <a:off x="3870538" y="4797457"/>
-            <a:ext cx="1402924" cy="1603342"/>
-          </a:xfrm>
-          <a:prstGeom prst="rect">
-            <a:avLst/>
-          </a:prstGeom>
-          <a:noFill/>
-          <a:extLst>
-            <a:ext uri="{909E8E84-426E-40DD-AFC4-6F175D3DCCD1}">
-              <a14:hiddenFill xmlns:a14="http://schemas.microsoft.com/office/drawing/2010/main">
-                <a:solidFill>
-                  <a:srgbClr val="FFFFFF"/>
-                </a:solidFill>
-              </a14:hiddenFill>
-            </a:ext>
-          </a:extLst>
-        </p:spPr>
-      </p:pic>
-    </p:spTree>
-    <p:extLst>
-      <p:ext uri="{BB962C8B-B14F-4D97-AF65-F5344CB8AC3E}">
-        <p14:creationId xmlns:p14="http://schemas.microsoft.com/office/powerpoint/2010/main" val="162253334"/>
       </p:ext>
     </p:extLst>
   </p:cSld>
@@ -12198,6 +12325,179 @@
           <p:cNvPr id="2" name="Title 1">
             <a:extLst>
               <a:ext uri="{FF2B5EF4-FFF2-40B4-BE49-F238E27FC236}">
+                <a16:creationId xmlns:a16="http://schemas.microsoft.com/office/drawing/2014/main" id="{5ED9DDD5-5CCB-8F4E-8491-C0C94F622400}"/>
+              </a:ext>
+            </a:extLst>
+          </p:cNvPr>
+          <p:cNvSpPr>
+            <a:spLocks noGrp="1"/>
+          </p:cNvSpPr>
+          <p:nvPr>
+            <p:ph type="title"/>
+          </p:nvPr>
+        </p:nvSpPr>
+        <p:spPr/>
+        <p:txBody>
+          <a:bodyPr/>
+          <a:lstStyle/>
+          <a:p>
+            <a:r>
+              <a:rPr lang="en-US" dirty="0"/>
+              <a:t>JSON package in GO</a:t>
+            </a:r>
+          </a:p>
+        </p:txBody>
+      </p:sp>
+      <p:sp>
+        <p:nvSpPr>
+          <p:cNvPr id="3" name="Text Placeholder 2">
+            <a:extLst>
+              <a:ext uri="{FF2B5EF4-FFF2-40B4-BE49-F238E27FC236}">
+                <a16:creationId xmlns:a16="http://schemas.microsoft.com/office/drawing/2014/main" id="{06AC7DC0-30A2-5B46-AD41-B2F75845C8EF}"/>
+              </a:ext>
+            </a:extLst>
+          </p:cNvPr>
+          <p:cNvSpPr>
+            <a:spLocks noGrp="1"/>
+          </p:cNvSpPr>
+          <p:nvPr>
+            <p:ph type="body" idx="1"/>
+          </p:nvPr>
+        </p:nvSpPr>
+        <p:spPr/>
+        <p:txBody>
+          <a:bodyPr/>
+          <a:lstStyle/>
+          <a:p>
+            <a:r>
+              <a:rPr lang="en-US" dirty="0"/>
+              <a:t> Most data in modern web applications is passed around in </a:t>
+            </a:r>
+            <a:r>
+              <a:rPr lang="en-US" dirty="0" err="1"/>
+              <a:t>Javascript</a:t>
+            </a:r>
+            <a:r>
+              <a:rPr lang="en-US" dirty="0"/>
+              <a:t> Object Notation (JSON).</a:t>
+            </a:r>
+          </a:p>
+          <a:p>
+            <a:r>
+              <a:rPr lang="en-US" dirty="0"/>
+              <a:t> GO comes with a </a:t>
+            </a:r>
+            <a:r>
+              <a:rPr lang="en-US" b="1" dirty="0"/>
+              <a:t>built-in</a:t>
+            </a:r>
+            <a:r>
+              <a:rPr lang="en-US" dirty="0"/>
+              <a:t> JSON package that allows you to </a:t>
+            </a:r>
+            <a:r>
+              <a:rPr lang="en-US" b="1" dirty="0"/>
+              <a:t>marshal/</a:t>
+            </a:r>
+            <a:r>
+              <a:rPr lang="en-US" b="1" dirty="0" err="1"/>
+              <a:t>unmarshal</a:t>
+            </a:r>
+            <a:r>
+              <a:rPr lang="en-US" dirty="0"/>
+              <a:t> data between structs and JSON types. </a:t>
+            </a:r>
+          </a:p>
+          <a:p>
+            <a:r>
+              <a:rPr lang="en-US" dirty="0"/>
+              <a:t>This is one of the most commonly utilized packages in GO and understanding it is essential.</a:t>
+            </a:r>
+          </a:p>
+        </p:txBody>
+      </p:sp>
+      <p:pic>
+        <p:nvPicPr>
+          <p:cNvPr id="1026" name="Picture 2" descr="Image result for go gopher">
+            <a:extLst>
+              <a:ext uri="{FF2B5EF4-FFF2-40B4-BE49-F238E27FC236}">
+                <a16:creationId xmlns:a16="http://schemas.microsoft.com/office/drawing/2014/main" id="{3275883E-32CB-1E4C-B34A-EB3A2EC71D9E}"/>
+              </a:ext>
+            </a:extLst>
+          </p:cNvPr>
+          <p:cNvPicPr>
+            <a:picLocks noChangeAspect="1" noChangeArrowheads="1"/>
+          </p:cNvPicPr>
+          <p:nvPr/>
+        </p:nvPicPr>
+        <p:blipFill>
+          <a:blip r:embed="rId2">
+            <a:extLst>
+              <a:ext uri="{28A0092B-C50C-407E-A947-70E740481C1C}">
+                <a14:useLocalDpi xmlns:a14="http://schemas.microsoft.com/office/drawing/2010/main" val="0"/>
+              </a:ext>
+            </a:extLst>
+          </a:blip>
+          <a:srcRect/>
+          <a:stretch>
+            <a:fillRect/>
+          </a:stretch>
+        </p:blipFill>
+        <p:spPr bwMode="auto">
+          <a:xfrm>
+            <a:off x="3870538" y="4797457"/>
+            <a:ext cx="1402924" cy="1603342"/>
+          </a:xfrm>
+          <a:prstGeom prst="rect">
+            <a:avLst/>
+          </a:prstGeom>
+          <a:noFill/>
+          <a:extLst>
+            <a:ext uri="{909E8E84-426E-40DD-AFC4-6F175D3DCCD1}">
+              <a14:hiddenFill xmlns:a14="http://schemas.microsoft.com/office/drawing/2010/main">
+                <a:solidFill>
+                  <a:srgbClr val="FFFFFF"/>
+                </a:solidFill>
+              </a14:hiddenFill>
+            </a:ext>
+          </a:extLst>
+        </p:spPr>
+      </p:pic>
+    </p:spTree>
+    <p:extLst>
+      <p:ext uri="{BB962C8B-B14F-4D97-AF65-F5344CB8AC3E}">
+        <p14:creationId xmlns:p14="http://schemas.microsoft.com/office/powerpoint/2010/main" val="162253334"/>
+      </p:ext>
+    </p:extLst>
+  </p:cSld>
+  <p:clrMapOvr>
+    <a:masterClrMapping/>
+  </p:clrMapOvr>
+</p:sld>
+</file>
+
+<file path=ppt/slides/slide31.xml><?xml version="1.0" encoding="utf-8"?>
+<p:sld xmlns:a="http://schemas.openxmlformats.org/drawingml/2006/main" xmlns:r="http://schemas.openxmlformats.org/officeDocument/2006/relationships" xmlns:p="http://schemas.openxmlformats.org/presentationml/2006/main">
+  <p:cSld>
+    <p:spTree>
+      <p:nvGrpSpPr>
+        <p:cNvPr id="1" name=""/>
+        <p:cNvGrpSpPr/>
+        <p:nvPr/>
+      </p:nvGrpSpPr>
+      <p:grpSpPr>
+        <a:xfrm>
+          <a:off x="0" y="0"/>
+          <a:ext cx="0" cy="0"/>
+          <a:chOff x="0" y="0"/>
+          <a:chExt cx="0" cy="0"/>
+        </a:xfrm>
+      </p:grpSpPr>
+      <p:sp>
+        <p:nvSpPr>
+          <p:cNvPr id="2" name="Title 1">
+            <a:extLst>
+              <a:ext uri="{FF2B5EF4-FFF2-40B4-BE49-F238E27FC236}">
                 <a16:creationId xmlns:a16="http://schemas.microsoft.com/office/drawing/2014/main" id="{EE65D7D0-EFB9-F74C-99E5-26557444C45F}"/>
               </a:ext>
             </a:extLst>
@@ -12343,7 +12643,7 @@
 </p:sld>
 </file>
 
-<file path=ppt/slides/slide31.xml><?xml version="1.0" encoding="utf-8"?>
+<file path=ppt/slides/slide32.xml><?xml version="1.0" encoding="utf-8"?>
 <p:sld xmlns:a="http://schemas.openxmlformats.org/drawingml/2006/main" xmlns:r="http://schemas.openxmlformats.org/officeDocument/2006/relationships" xmlns:p="http://schemas.openxmlformats.org/presentationml/2006/main">
   <p:cSld>
     <p:spTree>
@@ -12506,7 +12806,7 @@
 </p:sld>
 </file>
 
-<file path=ppt/slides/slide32.xml><?xml version="1.0" encoding="utf-8"?>
+<file path=ppt/slides/slide33.xml><?xml version="1.0" encoding="utf-8"?>
 <p:sld xmlns:a="http://schemas.openxmlformats.org/drawingml/2006/main" xmlns:r="http://schemas.openxmlformats.org/officeDocument/2006/relationships" xmlns:p="http://schemas.openxmlformats.org/presentationml/2006/main">
   <p:cSld>
     <p:spTree>
@@ -12648,7 +12948,7 @@
 </p:sld>
 </file>
 
-<file path=ppt/slides/slide33.xml><?xml version="1.0" encoding="utf-8"?>
+<file path=ppt/slides/slide34.xml><?xml version="1.0" encoding="utf-8"?>
 <p:sld xmlns:a="http://schemas.openxmlformats.org/drawingml/2006/main" xmlns:r="http://schemas.openxmlformats.org/officeDocument/2006/relationships" xmlns:p="http://schemas.openxmlformats.org/presentationml/2006/main">
   <p:cSld>
     <p:spTree>
@@ -12831,7 +13131,7 @@
 </p:sld>
 </file>
 
-<file path=ppt/slides/slide34.xml><?xml version="1.0" encoding="utf-8"?>
+<file path=ppt/slides/slide35.xml><?xml version="1.0" encoding="utf-8"?>
 <p:sld xmlns:a="http://schemas.openxmlformats.org/drawingml/2006/main" xmlns:r="http://schemas.openxmlformats.org/officeDocument/2006/relationships" xmlns:p="http://schemas.openxmlformats.org/presentationml/2006/main">
   <p:cSld>
     <p:spTree>
@@ -13077,7 +13377,7 @@
 </p:sld>
 </file>
 
-<file path=ppt/slides/slide35.xml><?xml version="1.0" encoding="utf-8"?>
+<file path=ppt/slides/slide36.xml><?xml version="1.0" encoding="utf-8"?>
 <p:sld xmlns:a="http://schemas.openxmlformats.org/drawingml/2006/main" xmlns:r="http://schemas.openxmlformats.org/officeDocument/2006/relationships" xmlns:p="http://schemas.openxmlformats.org/presentationml/2006/main">
   <p:cSld>
     <p:spTree>
@@ -13272,7 +13572,7 @@
 </p:sld>
 </file>
 
-<file path=ppt/slides/slide36.xml><?xml version="1.0" encoding="utf-8"?>
+<file path=ppt/slides/slide37.xml><?xml version="1.0" encoding="utf-8"?>
 <p:sld xmlns:a="http://schemas.openxmlformats.org/drawingml/2006/main" xmlns:r="http://schemas.openxmlformats.org/officeDocument/2006/relationships" xmlns:p="http://schemas.openxmlformats.org/presentationml/2006/main">
   <p:cSld>
     <p:spTree>
@@ -13463,7 +13763,7 @@
 </p:sld>
 </file>
 
-<file path=ppt/slides/slide37.xml><?xml version="1.0" encoding="utf-8"?>
+<file path=ppt/slides/slide38.xml><?xml version="1.0" encoding="utf-8"?>
 <p:sld xmlns:a="http://schemas.openxmlformats.org/drawingml/2006/main" xmlns:r="http://schemas.openxmlformats.org/officeDocument/2006/relationships" xmlns:p="http://schemas.openxmlformats.org/presentationml/2006/main">
   <p:cSld>
     <p:spTree>
@@ -13669,7 +13969,7 @@
 </p:sld>
 </file>
 
-<file path=ppt/slides/slide38.xml><?xml version="1.0" encoding="utf-8"?>
+<file path=ppt/slides/slide39.xml><?xml version="1.0" encoding="utf-8"?>
 <p:sld xmlns:a="http://schemas.openxmlformats.org/drawingml/2006/main" xmlns:r="http://schemas.openxmlformats.org/officeDocument/2006/relationships" xmlns:p="http://schemas.openxmlformats.org/presentationml/2006/main">
   <p:cSld>
     <p:spTree>
@@ -13809,170 +14109,6 @@
     <p:extLst>
       <p:ext uri="{BB962C8B-B14F-4D97-AF65-F5344CB8AC3E}">
         <p14:creationId xmlns:p14="http://schemas.microsoft.com/office/powerpoint/2010/main" val="2440003638"/>
-      </p:ext>
-    </p:extLst>
-  </p:cSld>
-  <p:clrMapOvr>
-    <a:masterClrMapping/>
-  </p:clrMapOvr>
-</p:sld>
-</file>
-
-<file path=ppt/slides/slide39.xml><?xml version="1.0" encoding="utf-8"?>
-<p:sld xmlns:a="http://schemas.openxmlformats.org/drawingml/2006/main" xmlns:r="http://schemas.openxmlformats.org/officeDocument/2006/relationships" xmlns:p="http://schemas.openxmlformats.org/presentationml/2006/main">
-  <p:cSld>
-    <p:spTree>
-      <p:nvGrpSpPr>
-        <p:cNvPr id="1" name=""/>
-        <p:cNvGrpSpPr/>
-        <p:nvPr/>
-      </p:nvGrpSpPr>
-      <p:grpSpPr>
-        <a:xfrm>
-          <a:off x="0" y="0"/>
-          <a:ext cx="0" cy="0"/>
-          <a:chOff x="0" y="0"/>
-          <a:chExt cx="0" cy="0"/>
-        </a:xfrm>
-      </p:grpSpPr>
-      <p:sp>
-        <p:nvSpPr>
-          <p:cNvPr id="2" name="Title 1">
-            <a:extLst>
-              <a:ext uri="{FF2B5EF4-FFF2-40B4-BE49-F238E27FC236}">
-                <a16:creationId xmlns:a16="http://schemas.microsoft.com/office/drawing/2014/main" id="{2612CCB9-FEE4-BE45-9BA3-623C0A8E8115}"/>
-              </a:ext>
-            </a:extLst>
-          </p:cNvPr>
-          <p:cNvSpPr>
-            <a:spLocks noGrp="1"/>
-          </p:cNvSpPr>
-          <p:nvPr>
-            <p:ph type="title"/>
-          </p:nvPr>
-        </p:nvSpPr>
-        <p:spPr/>
-        <p:txBody>
-          <a:bodyPr/>
-          <a:lstStyle/>
-          <a:p>
-            <a:r>
-              <a:rPr lang="en-US" dirty="0"/>
-              <a:t>Testing (continued)</a:t>
-            </a:r>
-          </a:p>
-        </p:txBody>
-      </p:sp>
-      <p:sp>
-        <p:nvSpPr>
-          <p:cNvPr id="3" name="Text Placeholder 2">
-            <a:extLst>
-              <a:ext uri="{FF2B5EF4-FFF2-40B4-BE49-F238E27FC236}">
-                <a16:creationId xmlns:a16="http://schemas.microsoft.com/office/drawing/2014/main" id="{ED012F15-4671-9E48-883E-94A915EF8545}"/>
-              </a:ext>
-            </a:extLst>
-          </p:cNvPr>
-          <p:cNvSpPr>
-            <a:spLocks noGrp="1"/>
-          </p:cNvSpPr>
-          <p:nvPr>
-            <p:ph type="body" idx="1"/>
-          </p:nvPr>
-        </p:nvSpPr>
-        <p:spPr/>
-        <p:txBody>
-          <a:bodyPr/>
-          <a:lstStyle/>
-          <a:p>
-            <a:r>
-              <a:rPr lang="en-US" dirty="0"/>
-              <a:t> Provided that you ended your test file with the appropriate </a:t>
-            </a:r>
-            <a:r>
-              <a:rPr lang="en-US" b="1" dirty="0"/>
-              <a:t>_</a:t>
-            </a:r>
-            <a:r>
-              <a:rPr lang="en-US" b="1" dirty="0" err="1"/>
-              <a:t>test.go</a:t>
-            </a:r>
-            <a:r>
-              <a:rPr lang="en-US" dirty="0"/>
-              <a:t> nomenclature- </a:t>
-            </a:r>
-            <a:r>
-              <a:rPr lang="en-US" b="1" dirty="0"/>
-              <a:t>the go compiler will not ship your tests</a:t>
-            </a:r>
-            <a:endParaRPr lang="en-US" dirty="0"/>
-          </a:p>
-          <a:p>
-            <a:r>
-              <a:rPr lang="en-US" dirty="0"/>
-              <a:t>SO- if you are building binaries to run- do </a:t>
-            </a:r>
-            <a:r>
-              <a:rPr lang="en-US" i="1" dirty="0"/>
-              <a:t>not</a:t>
-            </a:r>
-            <a:r>
-              <a:rPr lang="en-US" dirty="0"/>
-              <a:t> worry that your tests will end up in a binary- the go compiler is smart enough to know to skip those.</a:t>
-            </a:r>
-          </a:p>
-        </p:txBody>
-      </p:sp>
-      <p:pic>
-        <p:nvPicPr>
-          <p:cNvPr id="11266" name="Picture 2" descr="Image result for golang gopher">
-            <a:extLst>
-              <a:ext uri="{FF2B5EF4-FFF2-40B4-BE49-F238E27FC236}">
-                <a16:creationId xmlns:a16="http://schemas.microsoft.com/office/drawing/2014/main" id="{FFC16F7A-327D-6F4D-B1D0-980230BF43E0}"/>
-              </a:ext>
-            </a:extLst>
-          </p:cNvPr>
-          <p:cNvPicPr>
-            <a:picLocks noChangeAspect="1" noChangeArrowheads="1"/>
-          </p:cNvPicPr>
-          <p:nvPr/>
-        </p:nvPicPr>
-        <p:blipFill>
-          <a:blip r:embed="rId2">
-            <a:extLst>
-              <a:ext uri="{28A0092B-C50C-407E-A947-70E740481C1C}">
-                <a14:useLocalDpi xmlns:a14="http://schemas.microsoft.com/office/drawing/2010/main" val="0"/>
-              </a:ext>
-            </a:extLst>
-          </a:blip>
-          <a:srcRect/>
-          <a:stretch>
-            <a:fillRect/>
-          </a:stretch>
-        </p:blipFill>
-        <p:spPr bwMode="auto">
-          <a:xfrm>
-            <a:off x="2551980" y="4275056"/>
-            <a:ext cx="3568700" cy="2286000"/>
-          </a:xfrm>
-          <a:prstGeom prst="rect">
-            <a:avLst/>
-          </a:prstGeom>
-          <a:noFill/>
-          <a:extLst>
-            <a:ext uri="{909E8E84-426E-40DD-AFC4-6F175D3DCCD1}">
-              <a14:hiddenFill xmlns:a14="http://schemas.microsoft.com/office/drawing/2010/main">
-                <a:solidFill>
-                  <a:srgbClr val="FFFFFF"/>
-                </a:solidFill>
-              </a14:hiddenFill>
-            </a:ext>
-          </a:extLst>
-        </p:spPr>
-      </p:pic>
-    </p:spTree>
-    <p:extLst>
-      <p:ext uri="{BB962C8B-B14F-4D97-AF65-F5344CB8AC3E}">
-        <p14:creationId xmlns:p14="http://schemas.microsoft.com/office/powerpoint/2010/main" val="2640747515"/>
       </p:ext>
     </p:extLst>
   </p:cSld>
@@ -14322,6 +14458,170 @@
           <p:cNvPr id="2" name="Title 1">
             <a:extLst>
               <a:ext uri="{FF2B5EF4-FFF2-40B4-BE49-F238E27FC236}">
+                <a16:creationId xmlns:a16="http://schemas.microsoft.com/office/drawing/2014/main" id="{2612CCB9-FEE4-BE45-9BA3-623C0A8E8115}"/>
+              </a:ext>
+            </a:extLst>
+          </p:cNvPr>
+          <p:cNvSpPr>
+            <a:spLocks noGrp="1"/>
+          </p:cNvSpPr>
+          <p:nvPr>
+            <p:ph type="title"/>
+          </p:nvPr>
+        </p:nvSpPr>
+        <p:spPr/>
+        <p:txBody>
+          <a:bodyPr/>
+          <a:lstStyle/>
+          <a:p>
+            <a:r>
+              <a:rPr lang="en-US" dirty="0"/>
+              <a:t>Testing (continued)</a:t>
+            </a:r>
+          </a:p>
+        </p:txBody>
+      </p:sp>
+      <p:sp>
+        <p:nvSpPr>
+          <p:cNvPr id="3" name="Text Placeholder 2">
+            <a:extLst>
+              <a:ext uri="{FF2B5EF4-FFF2-40B4-BE49-F238E27FC236}">
+                <a16:creationId xmlns:a16="http://schemas.microsoft.com/office/drawing/2014/main" id="{ED012F15-4671-9E48-883E-94A915EF8545}"/>
+              </a:ext>
+            </a:extLst>
+          </p:cNvPr>
+          <p:cNvSpPr>
+            <a:spLocks noGrp="1"/>
+          </p:cNvSpPr>
+          <p:nvPr>
+            <p:ph type="body" idx="1"/>
+          </p:nvPr>
+        </p:nvSpPr>
+        <p:spPr/>
+        <p:txBody>
+          <a:bodyPr/>
+          <a:lstStyle/>
+          <a:p>
+            <a:r>
+              <a:rPr lang="en-US" dirty="0"/>
+              <a:t> Provided that you ended your test file with the appropriate </a:t>
+            </a:r>
+            <a:r>
+              <a:rPr lang="en-US" b="1" dirty="0"/>
+              <a:t>_</a:t>
+            </a:r>
+            <a:r>
+              <a:rPr lang="en-US" b="1" dirty="0" err="1"/>
+              <a:t>test.go</a:t>
+            </a:r>
+            <a:r>
+              <a:rPr lang="en-US" dirty="0"/>
+              <a:t> nomenclature- </a:t>
+            </a:r>
+            <a:r>
+              <a:rPr lang="en-US" b="1" dirty="0"/>
+              <a:t>the go compiler will not ship your tests</a:t>
+            </a:r>
+            <a:endParaRPr lang="en-US" dirty="0"/>
+          </a:p>
+          <a:p>
+            <a:r>
+              <a:rPr lang="en-US" dirty="0"/>
+              <a:t>SO- if you are building binaries to run- do </a:t>
+            </a:r>
+            <a:r>
+              <a:rPr lang="en-US" i="1" dirty="0"/>
+              <a:t>not</a:t>
+            </a:r>
+            <a:r>
+              <a:rPr lang="en-US" dirty="0"/>
+              <a:t> worry that your tests will end up in a binary- the go compiler is smart enough to know to skip those.</a:t>
+            </a:r>
+          </a:p>
+        </p:txBody>
+      </p:sp>
+      <p:pic>
+        <p:nvPicPr>
+          <p:cNvPr id="11266" name="Picture 2" descr="Image result for golang gopher">
+            <a:extLst>
+              <a:ext uri="{FF2B5EF4-FFF2-40B4-BE49-F238E27FC236}">
+                <a16:creationId xmlns:a16="http://schemas.microsoft.com/office/drawing/2014/main" id="{FFC16F7A-327D-6F4D-B1D0-980230BF43E0}"/>
+              </a:ext>
+            </a:extLst>
+          </p:cNvPr>
+          <p:cNvPicPr>
+            <a:picLocks noChangeAspect="1" noChangeArrowheads="1"/>
+          </p:cNvPicPr>
+          <p:nvPr/>
+        </p:nvPicPr>
+        <p:blipFill>
+          <a:blip r:embed="rId2">
+            <a:extLst>
+              <a:ext uri="{28A0092B-C50C-407E-A947-70E740481C1C}">
+                <a14:useLocalDpi xmlns:a14="http://schemas.microsoft.com/office/drawing/2010/main" val="0"/>
+              </a:ext>
+            </a:extLst>
+          </a:blip>
+          <a:srcRect/>
+          <a:stretch>
+            <a:fillRect/>
+          </a:stretch>
+        </p:blipFill>
+        <p:spPr bwMode="auto">
+          <a:xfrm>
+            <a:off x="2551980" y="4275056"/>
+            <a:ext cx="3568700" cy="2286000"/>
+          </a:xfrm>
+          <a:prstGeom prst="rect">
+            <a:avLst/>
+          </a:prstGeom>
+          <a:noFill/>
+          <a:extLst>
+            <a:ext uri="{909E8E84-426E-40DD-AFC4-6F175D3DCCD1}">
+              <a14:hiddenFill xmlns:a14="http://schemas.microsoft.com/office/drawing/2010/main">
+                <a:solidFill>
+                  <a:srgbClr val="FFFFFF"/>
+                </a:solidFill>
+              </a14:hiddenFill>
+            </a:ext>
+          </a:extLst>
+        </p:spPr>
+      </p:pic>
+    </p:spTree>
+    <p:extLst>
+      <p:ext uri="{BB962C8B-B14F-4D97-AF65-F5344CB8AC3E}">
+        <p14:creationId xmlns:p14="http://schemas.microsoft.com/office/powerpoint/2010/main" val="2640747515"/>
+      </p:ext>
+    </p:extLst>
+  </p:cSld>
+  <p:clrMapOvr>
+    <a:masterClrMapping/>
+  </p:clrMapOvr>
+</p:sld>
+</file>
+
+<file path=ppt/slides/slide41.xml><?xml version="1.0" encoding="utf-8"?>
+<p:sld xmlns:a="http://schemas.openxmlformats.org/drawingml/2006/main" xmlns:r="http://schemas.openxmlformats.org/officeDocument/2006/relationships" xmlns:p="http://schemas.openxmlformats.org/presentationml/2006/main">
+  <p:cSld>
+    <p:spTree>
+      <p:nvGrpSpPr>
+        <p:cNvPr id="1" name=""/>
+        <p:cNvGrpSpPr/>
+        <p:nvPr/>
+      </p:nvGrpSpPr>
+      <p:grpSpPr>
+        <a:xfrm>
+          <a:off x="0" y="0"/>
+          <a:ext cx="0" cy="0"/>
+          <a:chOff x="0" y="0"/>
+          <a:chExt cx="0" cy="0"/>
+        </a:xfrm>
+      </p:grpSpPr>
+      <p:sp>
+        <p:nvSpPr>
+          <p:cNvPr id="2" name="Title 1">
+            <a:extLst>
+              <a:ext uri="{FF2B5EF4-FFF2-40B4-BE49-F238E27FC236}">
                 <a16:creationId xmlns:a16="http://schemas.microsoft.com/office/drawing/2014/main" id="{283F25FD-2983-F34C-8580-730289BE0609}"/>
               </a:ext>
             </a:extLst>
@@ -14511,7 +14811,7 @@
 </p:sld>
 </file>
 
-<file path=ppt/slides/slide41.xml><?xml version="1.0" encoding="utf-8"?>
+<file path=ppt/slides/slide42.xml><?xml version="1.0" encoding="utf-8"?>
 <p:sld xmlns:a="http://schemas.openxmlformats.org/drawingml/2006/main" xmlns:r="http://schemas.openxmlformats.org/officeDocument/2006/relationships" xmlns:p="http://schemas.openxmlformats.org/presentationml/2006/main">
   <p:cSld>
     <p:spTree>
@@ -14678,7 +14978,7 @@
 </p:sld>
 </file>
 
-<file path=ppt/slides/slide42.xml><?xml version="1.0" encoding="utf-8"?>
+<file path=ppt/slides/slide43.xml><?xml version="1.0" encoding="utf-8"?>
 <p:sld xmlns:a="http://schemas.openxmlformats.org/drawingml/2006/main" xmlns:r="http://schemas.openxmlformats.org/officeDocument/2006/relationships" xmlns:p="http://schemas.openxmlformats.org/presentationml/2006/main">
   <p:cSld>
     <p:spTree>
@@ -14857,7 +15157,7 @@
 </p:sld>
 </file>
 
-<file path=ppt/slides/slide43.xml><?xml version="1.0" encoding="utf-8"?>
+<file path=ppt/slides/slide44.xml><?xml version="1.0" encoding="utf-8"?>
 <p:sld xmlns:a="http://schemas.openxmlformats.org/drawingml/2006/main" xmlns:r="http://schemas.openxmlformats.org/officeDocument/2006/relationships" xmlns:p="http://schemas.openxmlformats.org/presentationml/2006/main">
   <p:cSld>
     <p:spTree>
@@ -15094,7 +15394,7 @@
 </p:sld>
 </file>
 
-<file path=ppt/slides/slide44.xml><?xml version="1.0" encoding="utf-8"?>
+<file path=ppt/slides/slide45.xml><?xml version="1.0" encoding="utf-8"?>
 <p:sld xmlns:a="http://schemas.openxmlformats.org/drawingml/2006/main" xmlns:r="http://schemas.openxmlformats.org/officeDocument/2006/relationships" xmlns:p="http://schemas.openxmlformats.org/presentationml/2006/main">
   <p:cSld>
     <p:spTree>
@@ -15281,7 +15581,7 @@
 </p:sld>
 </file>
 
-<file path=ppt/slides/slide45.xml><?xml version="1.0" encoding="utf-8"?>
+<file path=ppt/slides/slide46.xml><?xml version="1.0" encoding="utf-8"?>
 <p:sld xmlns:a="http://schemas.openxmlformats.org/drawingml/2006/main" xmlns:r="http://schemas.openxmlformats.org/officeDocument/2006/relationships" xmlns:p="http://schemas.openxmlformats.org/presentationml/2006/main">
   <p:cSld>
     <p:spTree>
@@ -15419,7 +15719,7 @@
 </p:sld>
 </file>
 
-<file path=ppt/slides/slide46.xml><?xml version="1.0" encoding="utf-8"?>
+<file path=ppt/slides/slide47.xml><?xml version="1.0" encoding="utf-8"?>
 <p:sld xmlns:a="http://schemas.openxmlformats.org/drawingml/2006/main" xmlns:r="http://schemas.openxmlformats.org/officeDocument/2006/relationships" xmlns:p="http://schemas.openxmlformats.org/presentationml/2006/main">
   <p:cSld>
     <p:spTree>
@@ -15646,7 +15946,7 @@
 </p:sld>
 </file>
 
-<file path=ppt/slides/slide47.xml><?xml version="1.0" encoding="utf-8"?>
+<file path=ppt/slides/slide48.xml><?xml version="1.0" encoding="utf-8"?>
 <p:sld xmlns:a="http://schemas.openxmlformats.org/drawingml/2006/main" xmlns:r="http://schemas.openxmlformats.org/officeDocument/2006/relationships" xmlns:p="http://schemas.openxmlformats.org/presentationml/2006/main">
   <p:cSld>
     <p:spTree>
@@ -17572,7 +17872,7 @@
           <p:cNvPr id="2" name="Title 1">
             <a:extLst>
               <a:ext uri="{FF2B5EF4-FFF2-40B4-BE49-F238E27FC236}">
-                <a16:creationId xmlns:a16="http://schemas.microsoft.com/office/drawing/2014/main" id="{15BC9809-3E68-C44E-8771-33D80E9CA2D9}"/>
+                <a16:creationId xmlns:a16="http://schemas.microsoft.com/office/drawing/2014/main" id="{3CFA96A0-F4C6-AD4B-9DB5-CDF2A24744CE}"/>
               </a:ext>
             </a:extLst>
           </p:cNvPr>
@@ -17590,7 +17890,7 @@
           <a:p>
             <a:r>
               <a:rPr lang="en-US" dirty="0"/>
-              <a:t>SWITCH statements in GO</a:t>
+              <a:t>Quick note</a:t>
             </a:r>
           </a:p>
         </p:txBody>
@@ -17600,7 +17900,7 @@
           <p:cNvPr id="3" name="Text Placeholder 2">
             <a:extLst>
               <a:ext uri="{FF2B5EF4-FFF2-40B4-BE49-F238E27FC236}">
-                <a16:creationId xmlns:a16="http://schemas.microsoft.com/office/drawing/2014/main" id="{81EDBF52-78A6-DF46-9267-39A9C354CDB0}"/>
+                <a16:creationId xmlns:a16="http://schemas.microsoft.com/office/drawing/2014/main" id="{E5B866F8-4B6E-9445-AC98-58ED84709332}"/>
               </a:ext>
             </a:extLst>
           </p:cNvPr>
@@ -17618,183 +17918,47 @@
           <a:p>
             <a:r>
               <a:rPr lang="en-US" dirty="0"/>
-              <a:t> Again- similar to C– the </a:t>
+              <a:t>So if you use Python/Ruby/Node you might be used to having a built-in “IF-IN” statement- </a:t>
+            </a:r>
+            <a:r>
+              <a:rPr lang="en-US" dirty="0" err="1"/>
+              <a:t>i.e</a:t>
+            </a:r>
+            <a:r>
+              <a:rPr lang="en-US" dirty="0"/>
+              <a:t>: “IF 3 in [1,2,3,4,5,6]”</a:t>
+            </a:r>
+          </a:p>
+          <a:p>
+            <a:r>
+              <a:rPr lang="en-US" dirty="0"/>
+              <a:t> This </a:t>
             </a:r>
             <a:r>
               <a:rPr lang="en-US" b="1" dirty="0"/>
-              <a:t>switch</a:t>
-            </a:r>
-            <a:r>
-              <a:rPr lang="en-US" dirty="0"/>
-              <a:t> statement here is mainly to avoid making us create a long series of really ugly </a:t>
+              <a:t>does not</a:t>
+            </a:r>
+            <a:r>
+              <a:rPr lang="en-US" dirty="0"/>
+              <a:t> exist in GO (yet)…so there are a few ways around this: One is to iterate through the array with an IF….the other is to use a </a:t>
             </a:r>
             <a:r>
               <a:rPr lang="en-US" b="1" dirty="0"/>
-              <a:t>if-then</a:t>
-            </a:r>
-            <a:r>
-              <a:rPr lang="en-US" dirty="0"/>
-              <a:t> statements.:</a:t>
-            </a:r>
-          </a:p>
-          <a:p>
-            <a:pPr marL="177800" indent="0">
-              <a:buNone/>
-            </a:pPr>
-            <a:endParaRPr lang="en-US" dirty="0"/>
-          </a:p>
-          <a:p>
-            <a:pPr marL="177800" indent="0">
-              <a:buNone/>
-            </a:pPr>
-            <a:r>
-              <a:rPr lang="en-US" sz="1800" dirty="0" err="1">
-                <a:highlight>
-                  <a:srgbClr val="FFFF00"/>
-                </a:highlight>
-              </a:rPr>
-              <a:t>myRanking</a:t>
-            </a:r>
-            <a:r>
-              <a:rPr lang="en-US" sz="1800" dirty="0">
-                <a:highlight>
-                  <a:srgbClr val="FFFF00"/>
-                </a:highlight>
-              </a:rPr>
-              <a:t> := 7</a:t>
-            </a:r>
-          </a:p>
-          <a:p>
-            <a:pPr marL="177800" indent="0">
-              <a:buNone/>
-            </a:pPr>
-            <a:endParaRPr lang="en-US" sz="1800" dirty="0">
-              <a:highlight>
-                <a:srgbClr val="FFFF00"/>
-              </a:highlight>
-            </a:endParaRPr>
-          </a:p>
-          <a:p>
-            <a:pPr marL="177800" indent="0">
-              <a:buNone/>
-            </a:pPr>
-            <a:r>
-              <a:rPr lang="en-US" sz="1800" dirty="0">
-                <a:highlight>
-                  <a:srgbClr val="FFFF00"/>
-                </a:highlight>
-              </a:rPr>
-              <a:t>switch </a:t>
-            </a:r>
-            <a:r>
-              <a:rPr lang="en-US" sz="1800" dirty="0" err="1">
-                <a:highlight>
-                  <a:srgbClr val="FFFF00"/>
-                </a:highlight>
-              </a:rPr>
-              <a:t>myRanking</a:t>
-            </a:r>
-            <a:r>
-              <a:rPr lang="en-US" sz="1800" dirty="0">
-                <a:highlight>
-                  <a:srgbClr val="FFFF00"/>
-                </a:highlight>
-              </a:rPr>
-              <a:t> {</a:t>
-            </a:r>
-          </a:p>
-          <a:p>
-            <a:pPr marL="177800" indent="0">
-              <a:buNone/>
-            </a:pPr>
-            <a:r>
-              <a:rPr lang="en-US" sz="1800" dirty="0">
-                <a:highlight>
-                  <a:srgbClr val="FFFF00"/>
-                </a:highlight>
-              </a:rPr>
-              <a:t>	case 1:</a:t>
-            </a:r>
-          </a:p>
-          <a:p>
-            <a:pPr marL="177800" indent="0">
-              <a:buNone/>
-            </a:pPr>
-            <a:r>
-              <a:rPr lang="en-US" sz="1800" dirty="0">
-                <a:highlight>
-                  <a:srgbClr val="FFFF00"/>
-                </a:highlight>
-              </a:rPr>
-              <a:t>		</a:t>
-            </a:r>
-            <a:r>
-              <a:rPr lang="en-US" sz="1800" dirty="0" err="1">
-                <a:highlight>
-                  <a:srgbClr val="FFFF00"/>
-                </a:highlight>
-              </a:rPr>
-              <a:t>fmt.Println</a:t>
-            </a:r>
-            <a:r>
-              <a:rPr lang="en-US" sz="1800" dirty="0">
-                <a:highlight>
-                  <a:srgbClr val="FFFF00"/>
-                </a:highlight>
-              </a:rPr>
-              <a:t>(“Terrible”)</a:t>
-            </a:r>
-          </a:p>
-          <a:p>
-            <a:pPr marL="177800" indent="0">
-              <a:buNone/>
-            </a:pPr>
-            <a:r>
-              <a:rPr lang="en-US" sz="1800" dirty="0">
-                <a:highlight>
-                  <a:srgbClr val="FFFF00"/>
-                </a:highlight>
-              </a:rPr>
-              <a:t>	case 2:</a:t>
-            </a:r>
-          </a:p>
-          <a:p>
-            <a:pPr marL="177800" indent="0">
-              <a:buNone/>
-            </a:pPr>
-            <a:r>
-              <a:rPr lang="en-US" sz="1800" dirty="0">
-                <a:highlight>
-                  <a:srgbClr val="FFFF00"/>
-                </a:highlight>
-              </a:rPr>
-              <a:t>		</a:t>
-            </a:r>
-            <a:r>
-              <a:rPr lang="en-US" sz="1800" dirty="0" err="1">
-                <a:highlight>
-                  <a:srgbClr val="FFFF00"/>
-                </a:highlight>
-              </a:rPr>
-              <a:t>fmt.Println</a:t>
-            </a:r>
-            <a:r>
-              <a:rPr lang="en-US" sz="1800" dirty="0">
-                <a:highlight>
-                  <a:srgbClr val="FFFF00"/>
-                </a:highlight>
-              </a:rPr>
-              <a:t>(“Really Bad”)</a:t>
+              <a:t>map</a:t>
+            </a:r>
+            <a:r>
+              <a:rPr lang="en-US" dirty="0"/>
+              <a:t>.</a:t>
             </a:r>
           </a:p>
         </p:txBody>
       </p:sp>
       <p:pic>
         <p:nvPicPr>
-          <p:cNvPr id="5122" name="Picture 2" descr="Image result for go gopher images">
+          <p:cNvPr id="1026" name="Picture 2" descr="Image result for golang gopher">
             <a:extLst>
               <a:ext uri="{FF2B5EF4-FFF2-40B4-BE49-F238E27FC236}">
-                <a16:creationId xmlns:a16="http://schemas.microsoft.com/office/drawing/2014/main" id="{29AC8BFE-B467-E445-93E8-69788BB4BF28}"/>
+                <a16:creationId xmlns:a16="http://schemas.microsoft.com/office/drawing/2014/main" id="{A913BF61-5B7F-B441-A8B8-8E2BD0268A5F}"/>
               </a:ext>
             </a:extLst>
           </p:cNvPr>
@@ -17818,8 +17982,8 @@
         </p:blipFill>
         <p:spPr bwMode="auto">
           <a:xfrm>
-            <a:off x="5481098" y="2961784"/>
-            <a:ext cx="2857500" cy="2857500"/>
+            <a:off x="2743200" y="4178299"/>
+            <a:ext cx="3657600" cy="2222500"/>
           </a:xfrm>
           <a:prstGeom prst="rect">
             <a:avLst/>
@@ -17839,7 +18003,7 @@
     </p:spTree>
     <p:extLst>
       <p:ext uri="{BB962C8B-B14F-4D97-AF65-F5344CB8AC3E}">
-        <p14:creationId xmlns:p14="http://schemas.microsoft.com/office/powerpoint/2010/main" val="948789108"/>
+        <p14:creationId xmlns:p14="http://schemas.microsoft.com/office/powerpoint/2010/main" val="2326364716"/>
       </p:ext>
     </p:extLst>
   </p:cSld>

</xml_diff>